<commit_message>
updated preentation with larger font
</commit_message>
<xml_diff>
--- a/documents/presentation/Time_Management_Tool.pptx
+++ b/documents/presentation/Time_Management_Tool.pptx
@@ -250,7 +250,7 @@
           <a:p>
             <a:fld id="{058ABBF3-49A8-4B3F-9773-22E67695BB12}" type="datetimeFigureOut">
               <a:rPr lang="en-US" smtClean="0"/>
-              <a:t>11/22/2023</a:t>
+              <a:t>12/6/2023</a:t>
             </a:fld>
             <a:endParaRPr lang="en-US" dirty="0"/>
           </a:p>
@@ -427,7 +427,7 @@
           <a:p>
             <a:fld id="{F44AAC2B-A50D-4386-849A-6B59FB991B4C}" type="datetimeFigureOut">
               <a:rPr lang="en-US" smtClean="0"/>
-              <a:t>11/22/2023</a:t>
+              <a:t>12/6/2023</a:t>
             </a:fld>
             <a:endParaRPr lang="en-US" dirty="0"/>
           </a:p>
@@ -50712,14 +50712,16 @@
           </a:xfrm>
         </p:spPr>
         <p:txBody>
-          <a:bodyPr/>
+          <a:bodyPr>
+            <a:normAutofit/>
+          </a:bodyPr>
           <a:lstStyle/>
           <a:p>
             <a:pPr marL="0" indent="0">
               <a:buNone/>
             </a:pPr>
             <a:r>
-              <a:rPr lang="en-US" dirty="0"/>
+              <a:rPr lang="en-US" sz="2400" dirty="0"/>
               <a:t>A time management tool using command line to record and track time usage</a:t>
             </a:r>
           </a:p>
@@ -50808,7 +50810,7 @@
         </p:nvSpPr>
         <p:spPr>
           <a:xfrm>
-            <a:off x="2972610" y="1405891"/>
+            <a:off x="2843308" y="1405891"/>
             <a:ext cx="4188904" cy="3657600"/>
           </a:xfrm>
         </p:spPr>
@@ -50819,20 +50821,20 @@
           <a:lstStyle/>
           <a:p>
             <a:r>
-              <a:rPr lang="en-US" b="1" dirty="0"/>
+              <a:rPr lang="en-US" sz="2800" b="1" dirty="0"/>
               <a:t>Easy to use </a:t>
             </a:r>
             <a:r>
-              <a:rPr lang="en-US" dirty="0"/>
+              <a:rPr lang="en-US" sz="2800" dirty="0"/>
               <a:t>application</a:t>
             </a:r>
           </a:p>
           <a:p>
-            <a:endParaRPr lang="en-US" dirty="0"/>
+            <a:endParaRPr lang="en-US" sz="2800" dirty="0"/>
           </a:p>
           <a:p>
             <a:r>
-              <a:rPr lang="en-US" dirty="0"/>
+              <a:rPr lang="en-US" sz="2800" dirty="0"/>
               <a:t>*Prompted instructions upon running program</a:t>
             </a:r>
           </a:p>
@@ -51223,7 +51225,7 @@
         </p:spPr>
         <p:txBody>
           <a:bodyPr>
-            <a:normAutofit/>
+            <a:noAutofit/>
           </a:bodyPr>
           <a:lstStyle/>
           <a:p>
@@ -51232,12 +51234,12 @@
               <a:buChar char="•"/>
             </a:pPr>
             <a:r>
-              <a:rPr lang="en-US" sz="2000" dirty="0"/>
+              <a:rPr lang="en-US" sz="2800" dirty="0"/>
               <a:t>Record time using today’s date or key word “today” for fast recording time</a:t>
             </a:r>
           </a:p>
           <a:p>
-            <a:endParaRPr lang="en-US" sz="2000" dirty="0"/>
+            <a:endParaRPr lang="en-US" sz="2800" dirty="0"/>
           </a:p>
           <a:p>
             <a:pPr marL="342900" indent="-342900">
@@ -51245,7 +51247,7 @@
               <a:buChar char="•"/>
             </a:pPr>
             <a:r>
-              <a:rPr lang="en-US" sz="2000" dirty="0"/>
+              <a:rPr lang="en-US" sz="2800" dirty="0"/>
               <a:t>Confirmation upon successful recording</a:t>
             </a:r>
           </a:p>
@@ -51667,54 +51669,19 @@
           <a:p>
             <a:pPr marL="342900" indent="-342900"/>
             <a:r>
-              <a:rPr lang="en-US" sz="2400" dirty="0"/>
+              <a:rPr lang="en-US" dirty="0"/>
               <a:t>Query information based off date</a:t>
             </a:r>
           </a:p>
           <a:p>
             <a:pPr marL="342900" indent="-342900"/>
             <a:r>
-              <a:rPr lang="en-US" sz="2400" dirty="0"/>
+              <a:rPr lang="en-US" dirty="0"/>
               <a:t>Use key word “today” for faster results</a:t>
             </a:r>
           </a:p>
           <a:p>
             <a:endParaRPr lang="en-US" dirty="0"/>
-          </a:p>
-        </p:txBody>
-      </p:sp>
-      <p:sp>
-        <p:nvSpPr>
-          <p:cNvPr id="33" name="TextBox 32">
-            <a:extLst>
-              <a:ext uri="{FF2B5EF4-FFF2-40B4-BE49-F238E27FC236}">
-                <a16:creationId xmlns:a16="http://schemas.microsoft.com/office/drawing/2014/main" id="{BECDA3F6-790B-F71A-B844-0EAEAF5B1205}"/>
-              </a:ext>
-            </a:extLst>
-          </p:cNvPr>
-          <p:cNvSpPr txBox="1"/>
-          <p:nvPr/>
-        </p:nvSpPr>
-        <p:spPr>
-          <a:xfrm>
-            <a:off x="2341252" y="1697248"/>
-            <a:ext cx="6096000" cy="369332"/>
-          </a:xfrm>
-          <a:prstGeom prst="rect">
-            <a:avLst/>
-          </a:prstGeom>
-          <a:noFill/>
-        </p:spPr>
-        <p:txBody>
-          <a:bodyPr wrap="square">
-            <a:spAutoFit/>
-          </a:bodyPr>
-          <a:lstStyle/>
-          <a:p>
-            <a:r>
-              <a:rPr lang="en-US" dirty="0"/>
-              <a:t>Query Information</a:t>
-            </a:r>
           </a:p>
         </p:txBody>
       </p:sp>
@@ -52077,7 +52044,7 @@
               <a:buChar char="•"/>
             </a:pPr>
             <a:r>
-              <a:rPr lang="en-ZA" sz="2400" dirty="0"/>
+              <a:rPr lang="en-ZA" dirty="0"/>
               <a:t>Query time based on related tasks</a:t>
             </a:r>
           </a:p>
@@ -52087,47 +52054,12 @@
               <a:buChar char="•"/>
             </a:pPr>
             <a:r>
-              <a:rPr lang="en-ZA" sz="2400" dirty="0"/>
+              <a:rPr lang="en-ZA" dirty="0"/>
               <a:t>Query time based on tag</a:t>
             </a:r>
           </a:p>
           <a:p>
             <a:endParaRPr lang="en-US" dirty="0"/>
-          </a:p>
-        </p:txBody>
-      </p:sp>
-      <p:sp>
-        <p:nvSpPr>
-          <p:cNvPr id="33" name="TextBox 32">
-            <a:extLst>
-              <a:ext uri="{FF2B5EF4-FFF2-40B4-BE49-F238E27FC236}">
-                <a16:creationId xmlns:a16="http://schemas.microsoft.com/office/drawing/2014/main" id="{BECDA3F6-790B-F71A-B844-0EAEAF5B1205}"/>
-              </a:ext>
-            </a:extLst>
-          </p:cNvPr>
-          <p:cNvSpPr txBox="1"/>
-          <p:nvPr/>
-        </p:nvSpPr>
-        <p:spPr>
-          <a:xfrm>
-            <a:off x="2341252" y="1697248"/>
-            <a:ext cx="6096000" cy="369332"/>
-          </a:xfrm>
-          <a:prstGeom prst="rect">
-            <a:avLst/>
-          </a:prstGeom>
-          <a:noFill/>
-        </p:spPr>
-        <p:txBody>
-          <a:bodyPr wrap="square">
-            <a:spAutoFit/>
-          </a:bodyPr>
-          <a:lstStyle/>
-          <a:p>
-            <a:r>
-              <a:rPr lang="en-US" dirty="0"/>
-              <a:t>Query Information</a:t>
-            </a:r>
           </a:p>
         </p:txBody>
       </p:sp>
@@ -52287,7 +52219,7 @@
               <a:buChar char="•"/>
             </a:pPr>
             <a:r>
-              <a:rPr lang="en-ZA" dirty="0"/>
+              <a:rPr lang="en-ZA" sz="2800" dirty="0"/>
               <a:t>Obtain insight on time usage by generating a report</a:t>
             </a:r>
           </a:p>
@@ -52297,7 +52229,7 @@
               <a:buChar char="•"/>
             </a:pPr>
             <a:r>
-              <a:rPr lang="en-ZA" dirty="0"/>
+              <a:rPr lang="en-ZA" sz="2800" dirty="0"/>
               <a:t>Use key word “today” for faster results</a:t>
             </a:r>
           </a:p>
@@ -52710,7 +52642,7 @@
         </p:spPr>
         <p:txBody>
           <a:bodyPr>
-            <a:normAutofit/>
+            <a:noAutofit/>
           </a:bodyPr>
           <a:lstStyle/>
           <a:p>
@@ -52718,23 +52650,23 @@
               <a:buNone/>
             </a:pPr>
             <a:r>
-              <a:rPr lang="en-US" sz="2400" dirty="0"/>
+              <a:rPr lang="en-US" sz="2800" dirty="0"/>
               <a:t>Receive a list of your top </a:t>
             </a:r>
             <a:r>
-              <a:rPr lang="en-US" sz="2400" b="1" dirty="0"/>
+              <a:rPr lang="en-US" sz="2800" b="1" dirty="0"/>
               <a:t>10</a:t>
             </a:r>
             <a:r>
-              <a:rPr lang="en-US" sz="2400" dirty="0"/>
+              <a:rPr lang="en-US" sz="2800" dirty="0"/>
               <a:t> </a:t>
             </a:r>
             <a:r>
-              <a:rPr lang="en-US" sz="2400" b="1" dirty="0"/>
+              <a:rPr lang="en-US" sz="2800" b="1" dirty="0"/>
               <a:t>frequently done tasks </a:t>
             </a:r>
             <a:r>
-              <a:rPr lang="en-US" sz="2400" dirty="0"/>
+              <a:rPr lang="en-US" sz="2800" dirty="0"/>
               <a:t>in order</a:t>
             </a:r>
           </a:p>
@@ -53711,26 +53643,6 @@
 </file>
 
 <file path=customXml/item1.xml><?xml version="1.0" encoding="utf-8"?>
-<p:properties xmlns:p="http://schemas.microsoft.com/office/2006/metadata/properties" xmlns:xsi="http://www.w3.org/2001/XMLSchema-instance" xmlns:pc="http://schemas.microsoft.com/office/infopath/2007/PartnerControls">
-  <documentManagement>
-    <_ip_UnifiedCompliancePolicyUIAction xmlns="http://schemas.microsoft.com/sharepoint/v3" xsi:nil="true"/>
-    <Image xmlns="71af3243-3dd4-4a8d-8c0d-dd76da1f02a5">
-      <Url xsi:nil="true"/>
-      <Description xsi:nil="true"/>
-    </Image>
-    <Status xmlns="71af3243-3dd4-4a8d-8c0d-dd76da1f02a5">Not started</Status>
-    <_ip_UnifiedCompliancePolicyProperties xmlns="http://schemas.microsoft.com/sharepoint/v3" xsi:nil="true"/>
-    <ImageTagsTaxHTField xmlns="71af3243-3dd4-4a8d-8c0d-dd76da1f02a5">
-      <Terms xmlns="http://schemas.microsoft.com/office/infopath/2007/PartnerControls"/>
-    </ImageTagsTaxHTField>
-    <TaxCatchAll xmlns="230e9df3-be65-4c73-a93b-d1236ebd677e" xsi:nil="true"/>
-    <MediaServiceKeyPoints xmlns="71af3243-3dd4-4a8d-8c0d-dd76da1f02a5" xsi:nil="true"/>
-    <Background xmlns="71af3243-3dd4-4a8d-8c0d-dd76da1f02a5">false</Background>
-  </documentManagement>
-</p:properties>
-</file>
-
-<file path=customXml/item2.xml><?xml version="1.0" encoding="utf-8"?>
 <ct:contentTypeSchema xmlns:ct="http://schemas.microsoft.com/office/2006/metadata/contentType" xmlns:ma="http://schemas.microsoft.com/office/2006/metadata/properties/metaAttributes" ct:_="" ma:_="" ma:contentTypeName="Document" ma:contentTypeID="0x01010079F111ED35F8CC479449609E8A0923A6" ma:contentTypeVersion="28" ma:contentTypeDescription="Create a new document." ma:contentTypeScope="" ma:versionID="60f5a4f2d2b0abadcf532d48ebf9cb71">
   <xsd:schema xmlns:xsd="http://www.w3.org/2001/XMLSchema" xmlns:xs="http://www.w3.org/2001/XMLSchema" xmlns:p="http://schemas.microsoft.com/office/2006/metadata/properties" xmlns:ns1="http://schemas.microsoft.com/sharepoint/v3" xmlns:ns2="71af3243-3dd4-4a8d-8c0d-dd76da1f02a5" xmlns:ns3="16c05727-aa75-4e4a-9b5f-8a80a1165891" xmlns:ns4="230e9df3-be65-4c73-a93b-d1236ebd677e" targetNamespace="http://schemas.microsoft.com/office/2006/metadata/properties" ma:root="true" ma:fieldsID="7dd78129e6a1811f84807ad11c651531" ns1:_="" ns2:_="" ns3:_="" ns4:_="">
     <xsd:import namespace="http://schemas.microsoft.com/sharepoint/v3"/>
@@ -54042,6 +53954,26 @@
 </ct:contentTypeSchema>
 </file>
 
+<file path=customXml/item2.xml><?xml version="1.0" encoding="utf-8"?>
+<p:properties xmlns:p="http://schemas.microsoft.com/office/2006/metadata/properties" xmlns:xsi="http://www.w3.org/2001/XMLSchema-instance" xmlns:pc="http://schemas.microsoft.com/office/infopath/2007/PartnerControls">
+  <documentManagement>
+    <_ip_UnifiedCompliancePolicyUIAction xmlns="http://schemas.microsoft.com/sharepoint/v3" xsi:nil="true"/>
+    <Image xmlns="71af3243-3dd4-4a8d-8c0d-dd76da1f02a5">
+      <Url xsi:nil="true"/>
+      <Description xsi:nil="true"/>
+    </Image>
+    <Status xmlns="71af3243-3dd4-4a8d-8c0d-dd76da1f02a5">Not started</Status>
+    <_ip_UnifiedCompliancePolicyProperties xmlns="http://schemas.microsoft.com/sharepoint/v3" xsi:nil="true"/>
+    <ImageTagsTaxHTField xmlns="71af3243-3dd4-4a8d-8c0d-dd76da1f02a5">
+      <Terms xmlns="http://schemas.microsoft.com/office/infopath/2007/PartnerControls"/>
+    </ImageTagsTaxHTField>
+    <TaxCatchAll xmlns="230e9df3-be65-4c73-a93b-d1236ebd677e" xsi:nil="true"/>
+    <MediaServiceKeyPoints xmlns="71af3243-3dd4-4a8d-8c0d-dd76da1f02a5" xsi:nil="true"/>
+    <Background xmlns="71af3243-3dd4-4a8d-8c0d-dd76da1f02a5">false</Background>
+  </documentManagement>
+</p:properties>
+</file>
+
 <file path=customXml/item3.xml><?xml version="1.0" encoding="utf-8"?>
 <?mso-contentType ?>
 <FormTemplates xmlns="http://schemas.microsoft.com/sharepoint/v3/contenttype/forms">
@@ -54052,18 +53984,6 @@
 </file>
 
 <file path=customXml/itemProps1.xml><?xml version="1.0" encoding="utf-8"?>
-<ds:datastoreItem xmlns:ds="http://schemas.openxmlformats.org/officeDocument/2006/customXml" ds:itemID="{1B19A930-1B99-4E6A-8FC0-F4EC96DB90CA}">
-  <ds:schemaRefs>
-    <ds:schemaRef ds:uri="http://schemas.microsoft.com/office/2006/metadata/properties"/>
-    <ds:schemaRef ds:uri="http://schemas.microsoft.com/office/infopath/2007/PartnerControls"/>
-    <ds:schemaRef ds:uri="http://schemas.microsoft.com/sharepoint/v3"/>
-    <ds:schemaRef ds:uri="71af3243-3dd4-4a8d-8c0d-dd76da1f02a5"/>
-    <ds:schemaRef ds:uri="230e9df3-be65-4c73-a93b-d1236ebd677e"/>
-  </ds:schemaRefs>
-</ds:datastoreItem>
-</file>
-
-<file path=customXml/itemProps2.xml><?xml version="1.0" encoding="utf-8"?>
 <ds:datastoreItem xmlns:ds="http://schemas.openxmlformats.org/officeDocument/2006/customXml" ds:itemID="{C80DA2CF-4896-4B03-AE27-7F4BBB1B630E}">
   <ds:schemaRefs>
     <ds:schemaRef ds:uri="http://schemas.microsoft.com/office/2006/metadata/contentType"/>
@@ -54084,6 +54004,25 @@
 </ds:datastoreItem>
 </file>
 
+<file path=customXml/itemProps2.xml><?xml version="1.0" encoding="utf-8"?>
+<ds:datastoreItem xmlns:ds="http://schemas.openxmlformats.org/officeDocument/2006/customXml" ds:itemID="{1B19A930-1B99-4E6A-8FC0-F4EC96DB90CA}">
+  <ds:schemaRefs>
+    <ds:schemaRef ds:uri="230e9df3-be65-4c73-a93b-d1236ebd677e"/>
+    <ds:schemaRef ds:uri="http://schemas.microsoft.com/sharepoint/v3"/>
+    <ds:schemaRef ds:uri="http://purl.org/dc/dcmitype/"/>
+    <ds:schemaRef ds:uri="http://schemas.microsoft.com/office/2006/metadata/properties"/>
+    <ds:schemaRef ds:uri="http://purl.org/dc/terms/"/>
+    <ds:schemaRef ds:uri="http://schemas.microsoft.com/office/2006/documentManagement/types"/>
+    <ds:schemaRef ds:uri="http://www.w3.org/XML/1998/namespace"/>
+    <ds:schemaRef ds:uri="http://schemas.microsoft.com/office/infopath/2007/PartnerControls"/>
+    <ds:schemaRef ds:uri="http://schemas.openxmlformats.org/package/2006/metadata/core-properties"/>
+    <ds:schemaRef ds:uri="16c05727-aa75-4e4a-9b5f-8a80a1165891"/>
+    <ds:schemaRef ds:uri="71af3243-3dd4-4a8d-8c0d-dd76da1f02a5"/>
+    <ds:schemaRef ds:uri="http://purl.org/dc/elements/1.1/"/>
+  </ds:schemaRefs>
+</ds:datastoreItem>
+</file>
+
 <file path=customXml/itemProps3.xml><?xml version="1.0" encoding="utf-8"?>
 <ds:datastoreItem xmlns:ds="http://schemas.openxmlformats.org/officeDocument/2006/customXml" ds:itemID="{8B8D7BA3-8A6F-4F51-B1EE-3B01AA004FC5}">
   <ds:schemaRefs>

</xml_diff>